<commit_message>
added stack slide in powerpoint presentation
</commit_message>
<xml_diff>
--- a/The ScAvenger’s Hunt.pptx
+++ b/The ScAvenger’s Hunt.pptx
@@ -8,13 +8,14 @@
     <p:sldId id="256" r:id="rId2"/>
     <p:sldId id="257" r:id="rId3"/>
     <p:sldId id="258" r:id="rId4"/>
-    <p:sldId id="259" r:id="rId5"/>
-    <p:sldId id="260" r:id="rId6"/>
-    <p:sldId id="264" r:id="rId7"/>
-    <p:sldId id="263" r:id="rId8"/>
-    <p:sldId id="261" r:id="rId9"/>
-    <p:sldId id="262" r:id="rId10"/>
-    <p:sldId id="265" r:id="rId11"/>
+    <p:sldId id="266" r:id="rId5"/>
+    <p:sldId id="259" r:id="rId6"/>
+    <p:sldId id="260" r:id="rId7"/>
+    <p:sldId id="264" r:id="rId8"/>
+    <p:sldId id="263" r:id="rId9"/>
+    <p:sldId id="261" r:id="rId10"/>
+    <p:sldId id="262" r:id="rId11"/>
+    <p:sldId id="265" r:id="rId12"/>
   </p:sldIdLst>
   <p:sldSz cx="12192000" cy="6858000"/>
   <p:notesSz cx="6858000" cy="9144000"/>
@@ -113,6 +114,11 @@
       </a:defRPr>
     </a:lvl9pPr>
   </p:defaultTextStyle>
+  <p:extLst>
+    <p:ext uri="{EFAFB233-063F-42B5-8137-9DF3F51BA10A}">
+      <p15:sldGuideLst xmlns:p15="http://schemas.microsoft.com/office/powerpoint/2012/main"/>
+    </p:ext>
+  </p:extLst>
 </p:presentation>
 </file>
 
@@ -6204,6 +6210,165 @@
           <a:chExt cx="0" cy="0"/>
         </a:xfrm>
       </p:grpSpPr>
+      <p:sp>
+        <p:nvSpPr>
+          <p:cNvPr id="3" name="Content Placeholder 2">
+            <a:extLst>
+              <a:ext uri="{FF2B5EF4-FFF2-40B4-BE49-F238E27FC236}">
+                <a16:creationId xmlns:a16="http://schemas.microsoft.com/office/drawing/2014/main" id="{3B913A63-DF3F-47B2-B050-75B56128851B}"/>
+              </a:ext>
+            </a:extLst>
+          </p:cNvPr>
+          <p:cNvSpPr>
+            <a:spLocks noGrp="1"/>
+          </p:cNvSpPr>
+          <p:nvPr>
+            <p:ph idx="1"/>
+          </p:nvPr>
+        </p:nvSpPr>
+        <p:spPr>
+          <a:xfrm>
+            <a:off x="1484310" y="342901"/>
+            <a:ext cx="10345740" cy="6238874"/>
+          </a:xfrm>
+        </p:spPr>
+        <p:txBody>
+          <a:bodyPr/>
+          <a:lstStyle/>
+          <a:p>
+            <a:pPr>
+              <a:buFont typeface="Wingdings" panose="05000000000000000000" pitchFamily="2" charset="2"/>
+              <a:buChar char="Ø"/>
+            </a:pPr>
+            <a:r>
+              <a:rPr lang="en-US" dirty="0"/>
+              <a:t>When the user is inside the target location, a popup with animations telling them that they've reached their location and will be given an option to either start the game again or close the popup.</a:t>
+            </a:r>
+          </a:p>
+          <a:p>
+            <a:pPr>
+              <a:buFont typeface="Wingdings" panose="05000000000000000000" pitchFamily="2" charset="2"/>
+              <a:buChar char="Ø"/>
+            </a:pPr>
+            <a:endParaRPr lang="en-US" dirty="0"/>
+          </a:p>
+          <a:p>
+            <a:pPr>
+              <a:buFont typeface="Wingdings" panose="05000000000000000000" pitchFamily="2" charset="2"/>
+              <a:buChar char="Ø"/>
+            </a:pPr>
+            <a:endParaRPr lang="en-US" dirty="0"/>
+          </a:p>
+          <a:p>
+            <a:pPr>
+              <a:buFont typeface="Wingdings" panose="05000000000000000000" pitchFamily="2" charset="2"/>
+              <a:buChar char="Ø"/>
+            </a:pPr>
+            <a:endParaRPr lang="en-US" dirty="0"/>
+          </a:p>
+          <a:p>
+            <a:pPr>
+              <a:buFont typeface="Wingdings" panose="05000000000000000000" pitchFamily="2" charset="2"/>
+              <a:buChar char="Ø"/>
+            </a:pPr>
+            <a:endParaRPr lang="en-US" dirty="0"/>
+          </a:p>
+          <a:p>
+            <a:pPr>
+              <a:buFont typeface="Wingdings" panose="05000000000000000000" pitchFamily="2" charset="2"/>
+              <a:buChar char="Ø"/>
+            </a:pPr>
+            <a:endParaRPr lang="en-US" dirty="0"/>
+          </a:p>
+          <a:p>
+            <a:pPr>
+              <a:buFont typeface="Wingdings" panose="05000000000000000000" pitchFamily="2" charset="2"/>
+              <a:buChar char="Ø"/>
+            </a:pPr>
+            <a:endParaRPr lang="en-US" dirty="0"/>
+          </a:p>
+          <a:p>
+            <a:pPr>
+              <a:buFont typeface="Wingdings" panose="05000000000000000000" pitchFamily="2" charset="2"/>
+              <a:buChar char="Ø"/>
+            </a:pPr>
+            <a:endParaRPr lang="en-US" dirty="0"/>
+          </a:p>
+          <a:p>
+            <a:pPr marL="0" indent="0">
+              <a:buNone/>
+            </a:pPr>
+            <a:endParaRPr lang="en-US" dirty="0"/>
+          </a:p>
+          <a:p>
+            <a:pPr>
+              <a:buFont typeface="Wingdings" panose="05000000000000000000" pitchFamily="2" charset="2"/>
+              <a:buChar char="Ø"/>
+            </a:pPr>
+            <a:endParaRPr lang="en-US" dirty="0"/>
+          </a:p>
+        </p:txBody>
+      </p:sp>
+      <p:pic>
+        <p:nvPicPr>
+          <p:cNvPr id="5" name="Picture 4">
+            <a:extLst>
+              <a:ext uri="{FF2B5EF4-FFF2-40B4-BE49-F238E27FC236}">
+                <a16:creationId xmlns:a16="http://schemas.microsoft.com/office/drawing/2014/main" id="{B3BB0A7B-65F3-4483-B20B-360E47824B0A}"/>
+              </a:ext>
+            </a:extLst>
+          </p:cNvPr>
+          <p:cNvPicPr>
+            <a:picLocks noChangeAspect="1"/>
+          </p:cNvPicPr>
+          <p:nvPr/>
+        </p:nvPicPr>
+        <p:blipFill>
+          <a:blip r:embed="rId2"/>
+          <a:stretch>
+            <a:fillRect/>
+          </a:stretch>
+        </p:blipFill>
+        <p:spPr>
+          <a:xfrm>
+            <a:off x="2462213" y="1924050"/>
+            <a:ext cx="7100888" cy="4362450"/>
+          </a:xfrm>
+          <a:prstGeom prst="rect">
+            <a:avLst/>
+          </a:prstGeom>
+        </p:spPr>
+      </p:pic>
+    </p:spTree>
+    <p:extLst>
+      <p:ext uri="{BB962C8B-B14F-4D97-AF65-F5344CB8AC3E}">
+        <p14:creationId xmlns:p14="http://schemas.microsoft.com/office/powerpoint/2010/main" val="3320754284"/>
+      </p:ext>
+    </p:extLst>
+  </p:cSld>
+  <p:clrMapOvr>
+    <a:masterClrMapping/>
+  </p:clrMapOvr>
+</p:sld>
+</file>
+
+<file path=ppt/slides/slide11.xml><?xml version="1.0" encoding="utf-8"?>
+<p:sld xmlns:a="http://schemas.openxmlformats.org/drawingml/2006/main" xmlns:r="http://schemas.openxmlformats.org/officeDocument/2006/relationships" xmlns:p="http://schemas.openxmlformats.org/presentationml/2006/main">
+  <p:cSld>
+    <p:spTree>
+      <p:nvGrpSpPr>
+        <p:cNvPr id="1" name=""/>
+        <p:cNvGrpSpPr/>
+        <p:nvPr/>
+      </p:nvGrpSpPr>
+      <p:grpSpPr>
+        <a:xfrm>
+          <a:off x="0" y="0"/>
+          <a:ext cx="0" cy="0"/>
+          <a:chOff x="0" y="0"/>
+          <a:chExt cx="0" cy="0"/>
+        </a:xfrm>
+      </p:grpSpPr>
       <p:pic>
         <p:nvPicPr>
           <p:cNvPr id="5" name="Content Placeholder 4">
@@ -6695,6 +6860,167 @@
       </p:grpSpPr>
       <p:sp>
         <p:nvSpPr>
+          <p:cNvPr id="2" name="Title 1">
+            <a:extLst>
+              <a:ext uri="{FF2B5EF4-FFF2-40B4-BE49-F238E27FC236}">
+                <a16:creationId xmlns:a16="http://schemas.microsoft.com/office/drawing/2014/main" id="{0A070315-5245-4981-B6E6-DE910B414EE0}"/>
+              </a:ext>
+            </a:extLst>
+          </p:cNvPr>
+          <p:cNvSpPr>
+            <a:spLocks noGrp="1"/>
+          </p:cNvSpPr>
+          <p:nvPr>
+            <p:ph type="title"/>
+          </p:nvPr>
+        </p:nvSpPr>
+        <p:spPr>
+          <a:xfrm>
+            <a:off x="1590675" y="685801"/>
+            <a:ext cx="9486899" cy="876299"/>
+          </a:xfrm>
+        </p:spPr>
+        <p:txBody>
+          <a:bodyPr/>
+          <a:lstStyle/>
+          <a:p>
+            <a:r>
+              <a:rPr lang="en-US" dirty="0"/>
+              <a:t>Stack </a:t>
+            </a:r>
+          </a:p>
+        </p:txBody>
+      </p:sp>
+      <p:sp>
+        <p:nvSpPr>
+          <p:cNvPr id="3" name="Content Placeholder 2">
+            <a:extLst>
+              <a:ext uri="{FF2B5EF4-FFF2-40B4-BE49-F238E27FC236}">
+                <a16:creationId xmlns:a16="http://schemas.microsoft.com/office/drawing/2014/main" id="{975F76DB-DE01-47D7-B456-C28219818CC9}"/>
+              </a:ext>
+            </a:extLst>
+          </p:cNvPr>
+          <p:cNvSpPr>
+            <a:spLocks noGrp="1"/>
+          </p:cNvSpPr>
+          <p:nvPr>
+            <p:ph idx="1"/>
+          </p:nvPr>
+        </p:nvSpPr>
+        <p:spPr>
+          <a:xfrm>
+            <a:off x="1998660" y="1914526"/>
+            <a:ext cx="8812215" cy="3924299"/>
+          </a:xfrm>
+        </p:spPr>
+        <p:txBody>
+          <a:bodyPr/>
+          <a:lstStyle/>
+          <a:p>
+            <a:pPr>
+              <a:buFont typeface="Wingdings" panose="05000000000000000000" pitchFamily="2" charset="2"/>
+              <a:buChar char="Ø"/>
+            </a:pPr>
+            <a:r>
+              <a:rPr lang="en-US" dirty="0"/>
+              <a:t>Platform: Node (v15.0.1)</a:t>
+            </a:r>
+          </a:p>
+          <a:p>
+            <a:pPr>
+              <a:buFont typeface="Wingdings" panose="05000000000000000000" pitchFamily="2" charset="2"/>
+              <a:buChar char="Ø"/>
+            </a:pPr>
+            <a:r>
+              <a:rPr lang="en-US" dirty="0"/>
+              <a:t>Web Framework: Express</a:t>
+            </a:r>
+          </a:p>
+          <a:p>
+            <a:pPr>
+              <a:buFont typeface="Wingdings" panose="05000000000000000000" pitchFamily="2" charset="2"/>
+              <a:buChar char="Ø"/>
+            </a:pPr>
+            <a:r>
+              <a:rPr lang="en-US" dirty="0"/>
+              <a:t>View engine: EJS</a:t>
+            </a:r>
+          </a:p>
+          <a:p>
+            <a:pPr>
+              <a:buFont typeface="Wingdings" panose="05000000000000000000" pitchFamily="2" charset="2"/>
+              <a:buChar char="Ø"/>
+            </a:pPr>
+            <a:r>
+              <a:rPr lang="en-US" dirty="0"/>
+              <a:t>Web App Host: Heroku</a:t>
+            </a:r>
+          </a:p>
+          <a:p>
+            <a:pPr>
+              <a:buFont typeface="Wingdings" panose="05000000000000000000" pitchFamily="2" charset="2"/>
+              <a:buChar char="Ø"/>
+            </a:pPr>
+            <a:r>
+              <a:rPr lang="en-US" dirty="0"/>
+              <a:t>ORM: PostgreSQL</a:t>
+            </a:r>
+          </a:p>
+          <a:p>
+            <a:pPr>
+              <a:buFont typeface="Wingdings" panose="05000000000000000000" pitchFamily="2" charset="2"/>
+              <a:buChar char="Ø"/>
+            </a:pPr>
+            <a:r>
+              <a:rPr lang="en-US" dirty="0"/>
+              <a:t>Coding standards: Prettier/</a:t>
+            </a:r>
+            <a:r>
+              <a:rPr lang="en-US" dirty="0" err="1"/>
+              <a:t>ESlint</a:t>
+            </a:r>
+            <a:endParaRPr lang="en-US" dirty="0"/>
+          </a:p>
+          <a:p>
+            <a:pPr marL="0" indent="0">
+              <a:buNone/>
+            </a:pPr>
+            <a:endParaRPr lang="en-US" dirty="0"/>
+          </a:p>
+        </p:txBody>
+      </p:sp>
+    </p:spTree>
+    <p:extLst>
+      <p:ext uri="{BB962C8B-B14F-4D97-AF65-F5344CB8AC3E}">
+        <p14:creationId xmlns:p14="http://schemas.microsoft.com/office/powerpoint/2010/main" val="2986218264"/>
+      </p:ext>
+    </p:extLst>
+  </p:cSld>
+  <p:clrMapOvr>
+    <a:masterClrMapping/>
+  </p:clrMapOvr>
+</p:sld>
+</file>
+
+<file path=ppt/slides/slide5.xml><?xml version="1.0" encoding="utf-8"?>
+<p:sld xmlns:a="http://schemas.openxmlformats.org/drawingml/2006/main" xmlns:r="http://schemas.openxmlformats.org/officeDocument/2006/relationships" xmlns:p="http://schemas.openxmlformats.org/presentationml/2006/main">
+  <p:cSld>
+    <p:spTree>
+      <p:nvGrpSpPr>
+        <p:cNvPr id="1" name=""/>
+        <p:cNvGrpSpPr/>
+        <p:nvPr/>
+      </p:nvGrpSpPr>
+      <p:grpSpPr>
+        <a:xfrm>
+          <a:off x="0" y="0"/>
+          <a:ext cx="0" cy="0"/>
+          <a:chOff x="0" y="0"/>
+          <a:chExt cx="0" cy="0"/>
+        </a:xfrm>
+      </p:grpSpPr>
+      <p:sp>
+        <p:nvSpPr>
           <p:cNvPr id="3" name="Content Placeholder 2">
             <a:extLst>
               <a:ext uri="{FF2B5EF4-FFF2-40B4-BE49-F238E27FC236}">
@@ -6853,7 +7179,7 @@
 </p:sld>
 </file>
 
-<file path=ppt/slides/slide5.xml><?xml version="1.0" encoding="utf-8"?>
+<file path=ppt/slides/slide6.xml><?xml version="1.0" encoding="utf-8"?>
 <p:sld xmlns:a="http://schemas.openxmlformats.org/drawingml/2006/main" xmlns:r="http://schemas.openxmlformats.org/officeDocument/2006/relationships" xmlns:p="http://schemas.openxmlformats.org/presentationml/2006/main">
   <p:cSld>
     <p:spTree>
@@ -7020,7 +7346,7 @@
 </p:sld>
 </file>
 
-<file path=ppt/slides/slide6.xml><?xml version="1.0" encoding="utf-8"?>
+<file path=ppt/slides/slide7.xml><?xml version="1.0" encoding="utf-8"?>
 <p:sld xmlns:a="http://schemas.openxmlformats.org/drawingml/2006/main" xmlns:r="http://schemas.openxmlformats.org/officeDocument/2006/relationships" xmlns:p="http://schemas.openxmlformats.org/presentationml/2006/main">
   <p:cSld>
     <p:spTree>
@@ -7211,7 +7537,7 @@
 </p:sld>
 </file>
 
-<file path=ppt/slides/slide7.xml><?xml version="1.0" encoding="utf-8"?>
+<file path=ppt/slides/slide8.xml><?xml version="1.0" encoding="utf-8"?>
 <p:sld xmlns:a="http://schemas.openxmlformats.org/drawingml/2006/main" xmlns:r="http://schemas.openxmlformats.org/officeDocument/2006/relationships" xmlns:p="http://schemas.openxmlformats.org/presentationml/2006/main">
   <p:cSld>
     <p:spTree>
@@ -7378,7 +7704,7 @@
 </p:sld>
 </file>
 
-<file path=ppt/slides/slide8.xml><?xml version="1.0" encoding="utf-8"?>
+<file path=ppt/slides/slide9.xml><?xml version="1.0" encoding="utf-8"?>
 <p:sld xmlns:a="http://schemas.openxmlformats.org/drawingml/2006/main" xmlns:r="http://schemas.openxmlformats.org/officeDocument/2006/relationships" xmlns:p="http://schemas.openxmlformats.org/presentationml/2006/main">
   <p:cSld>
     <p:spTree>
@@ -7535,165 +7861,6 @@
     <p:extLst>
       <p:ext uri="{BB962C8B-B14F-4D97-AF65-F5344CB8AC3E}">
         <p14:creationId xmlns:p14="http://schemas.microsoft.com/office/powerpoint/2010/main" val="4123400513"/>
-      </p:ext>
-    </p:extLst>
-  </p:cSld>
-  <p:clrMapOvr>
-    <a:masterClrMapping/>
-  </p:clrMapOvr>
-</p:sld>
-</file>
-
-<file path=ppt/slides/slide9.xml><?xml version="1.0" encoding="utf-8"?>
-<p:sld xmlns:a="http://schemas.openxmlformats.org/drawingml/2006/main" xmlns:r="http://schemas.openxmlformats.org/officeDocument/2006/relationships" xmlns:p="http://schemas.openxmlformats.org/presentationml/2006/main">
-  <p:cSld>
-    <p:spTree>
-      <p:nvGrpSpPr>
-        <p:cNvPr id="1" name=""/>
-        <p:cNvGrpSpPr/>
-        <p:nvPr/>
-      </p:nvGrpSpPr>
-      <p:grpSpPr>
-        <a:xfrm>
-          <a:off x="0" y="0"/>
-          <a:ext cx="0" cy="0"/>
-          <a:chOff x="0" y="0"/>
-          <a:chExt cx="0" cy="0"/>
-        </a:xfrm>
-      </p:grpSpPr>
-      <p:sp>
-        <p:nvSpPr>
-          <p:cNvPr id="3" name="Content Placeholder 2">
-            <a:extLst>
-              <a:ext uri="{FF2B5EF4-FFF2-40B4-BE49-F238E27FC236}">
-                <a16:creationId xmlns:a16="http://schemas.microsoft.com/office/drawing/2014/main" id="{3B913A63-DF3F-47B2-B050-75B56128851B}"/>
-              </a:ext>
-            </a:extLst>
-          </p:cNvPr>
-          <p:cNvSpPr>
-            <a:spLocks noGrp="1"/>
-          </p:cNvSpPr>
-          <p:nvPr>
-            <p:ph idx="1"/>
-          </p:nvPr>
-        </p:nvSpPr>
-        <p:spPr>
-          <a:xfrm>
-            <a:off x="1484310" y="342901"/>
-            <a:ext cx="10345740" cy="6238874"/>
-          </a:xfrm>
-        </p:spPr>
-        <p:txBody>
-          <a:bodyPr/>
-          <a:lstStyle/>
-          <a:p>
-            <a:pPr>
-              <a:buFont typeface="Wingdings" panose="05000000000000000000" pitchFamily="2" charset="2"/>
-              <a:buChar char="Ø"/>
-            </a:pPr>
-            <a:r>
-              <a:rPr lang="en-US" dirty="0"/>
-              <a:t>When the user is inside the target location, a popup with animations telling them that they've reached their location and will be given an option to either start the game again or close the popup.</a:t>
-            </a:r>
-          </a:p>
-          <a:p>
-            <a:pPr>
-              <a:buFont typeface="Wingdings" panose="05000000000000000000" pitchFamily="2" charset="2"/>
-              <a:buChar char="Ø"/>
-            </a:pPr>
-            <a:endParaRPr lang="en-US" dirty="0"/>
-          </a:p>
-          <a:p>
-            <a:pPr>
-              <a:buFont typeface="Wingdings" panose="05000000000000000000" pitchFamily="2" charset="2"/>
-              <a:buChar char="Ø"/>
-            </a:pPr>
-            <a:endParaRPr lang="en-US" dirty="0"/>
-          </a:p>
-          <a:p>
-            <a:pPr>
-              <a:buFont typeface="Wingdings" panose="05000000000000000000" pitchFamily="2" charset="2"/>
-              <a:buChar char="Ø"/>
-            </a:pPr>
-            <a:endParaRPr lang="en-US" dirty="0"/>
-          </a:p>
-          <a:p>
-            <a:pPr>
-              <a:buFont typeface="Wingdings" panose="05000000000000000000" pitchFamily="2" charset="2"/>
-              <a:buChar char="Ø"/>
-            </a:pPr>
-            <a:endParaRPr lang="en-US" dirty="0"/>
-          </a:p>
-          <a:p>
-            <a:pPr>
-              <a:buFont typeface="Wingdings" panose="05000000000000000000" pitchFamily="2" charset="2"/>
-              <a:buChar char="Ø"/>
-            </a:pPr>
-            <a:endParaRPr lang="en-US" dirty="0"/>
-          </a:p>
-          <a:p>
-            <a:pPr>
-              <a:buFont typeface="Wingdings" panose="05000000000000000000" pitchFamily="2" charset="2"/>
-              <a:buChar char="Ø"/>
-            </a:pPr>
-            <a:endParaRPr lang="en-US" dirty="0"/>
-          </a:p>
-          <a:p>
-            <a:pPr>
-              <a:buFont typeface="Wingdings" panose="05000000000000000000" pitchFamily="2" charset="2"/>
-              <a:buChar char="Ø"/>
-            </a:pPr>
-            <a:endParaRPr lang="en-US" dirty="0"/>
-          </a:p>
-          <a:p>
-            <a:pPr marL="0" indent="0">
-              <a:buNone/>
-            </a:pPr>
-            <a:endParaRPr lang="en-US" dirty="0"/>
-          </a:p>
-          <a:p>
-            <a:pPr>
-              <a:buFont typeface="Wingdings" panose="05000000000000000000" pitchFamily="2" charset="2"/>
-              <a:buChar char="Ø"/>
-            </a:pPr>
-            <a:endParaRPr lang="en-US" dirty="0"/>
-          </a:p>
-        </p:txBody>
-      </p:sp>
-      <p:pic>
-        <p:nvPicPr>
-          <p:cNvPr id="5" name="Picture 4">
-            <a:extLst>
-              <a:ext uri="{FF2B5EF4-FFF2-40B4-BE49-F238E27FC236}">
-                <a16:creationId xmlns:a16="http://schemas.microsoft.com/office/drawing/2014/main" id="{B3BB0A7B-65F3-4483-B20B-360E47824B0A}"/>
-              </a:ext>
-            </a:extLst>
-          </p:cNvPr>
-          <p:cNvPicPr>
-            <a:picLocks noChangeAspect="1"/>
-          </p:cNvPicPr>
-          <p:nvPr/>
-        </p:nvPicPr>
-        <p:blipFill>
-          <a:blip r:embed="rId2"/>
-          <a:stretch>
-            <a:fillRect/>
-          </a:stretch>
-        </p:blipFill>
-        <p:spPr>
-          <a:xfrm>
-            <a:off x="2462213" y="1924050"/>
-            <a:ext cx="7100888" cy="4362450"/>
-          </a:xfrm>
-          <a:prstGeom prst="rect">
-            <a:avLst/>
-          </a:prstGeom>
-        </p:spPr>
-      </p:pic>
-    </p:spTree>
-    <p:extLst>
-      <p:ext uri="{BB962C8B-B14F-4D97-AF65-F5344CB8AC3E}">
-        <p14:creationId xmlns:p14="http://schemas.microsoft.com/office/powerpoint/2010/main" val="3320754284"/>
       </p:ext>
     </p:extLst>
   </p:cSld>

</xml_diff>